<commit_message>
Added sprint Retrospective to powerpoint
</commit_message>
<xml_diff>
--- a/docs/Sprint 1 powerpoint.pptx
+++ b/docs/Sprint 1 powerpoint.pptx
@@ -7060,6 +7060,34 @@
         <p:txBody>
           <a:bodyPr/>
           <a:lstStyle/>
+          <a:p>
+            <a:pPr fontAlgn="base"/>
+            <a:r>
+              <a:rPr lang="en-US" dirty="0"/>
+              <a:t>More consistent on daily scrums</a:t>
+            </a:r>
+          </a:p>
+          <a:p>
+            <a:pPr fontAlgn="base"/>
+            <a:r>
+              <a:rPr lang="en-US" dirty="0"/>
+              <a:t>Set Sprint goals sooner</a:t>
+            </a:r>
+          </a:p>
+          <a:p>
+            <a:pPr fontAlgn="base"/>
+            <a:r>
+              <a:rPr lang="en-US" dirty="0"/>
+              <a:t>Better documentation of finished tasks</a:t>
+            </a:r>
+          </a:p>
+          <a:p>
+            <a:pPr fontAlgn="base"/>
+            <a:r>
+              <a:rPr lang="en-US" dirty="0"/>
+              <a:t>Sprint went well and we learned things that we can apply towards the next one</a:t>
+            </a:r>
+          </a:p>
           <a:p>
             <a:pPr fontAlgn="base"/>
             <a:endParaRPr lang="en-US" dirty="0"/>
@@ -7699,6 +7727,26 @@
 </file>
 
 <file path=customXml/item1.xml><?xml version="1.0" encoding="utf-8"?>
+<p:properties xmlns:p="http://schemas.microsoft.com/office/2006/metadata/properties" xmlns:xsi="http://www.w3.org/2001/XMLSchema-instance" xmlns:pc="http://schemas.microsoft.com/office/infopath/2007/PartnerControls">
+  <documentManagement>
+    <VSO_x0020_item_x0020_id xmlns="40262f94-9f35-4ac3-9a90-690165a166b7" xsi:nil="true"/>
+    <Assetid_x0020_ xmlns="40262f94-9f35-4ac3-9a90-690165a166b7" xsi:nil="true"/>
+    <Item_x0020_Details xmlns="40262f94-9f35-4ac3-9a90-690165a166b7" xsi:nil="true"/>
+    <Template_x0020_details xmlns="40262f94-9f35-4ac3-9a90-690165a166b7" xsi:nil="true"/>
+  </documentManagement>
+</p:properties>
+</file>
+
+<file path=customXml/item2.xml><?xml version="1.0" encoding="utf-8"?>
+<?mso-contentType ?>
+<FormTemplates xmlns="http://schemas.microsoft.com/sharepoint/v3/contenttype/forms">
+  <Display>DocumentLibraryForm</Display>
+  <Edit>DocumentLibraryForm</Edit>
+  <New>DocumentLibraryForm</New>
+</FormTemplates>
+</file>
+
+<file path=customXml/item3.xml><?xml version="1.0" encoding="utf-8"?>
 <ct:contentTypeSchema xmlns:ct="http://schemas.microsoft.com/office/2006/metadata/contentType" xmlns:ma="http://schemas.microsoft.com/office/2006/metadata/properties/metaAttributes" ct:_="" ma:_="" ma:contentTypeName="Document" ma:contentTypeID="0x010100AA3F7D94069FF64A86F7DFF56D60E3BE" ma:contentTypeVersion="6" ma:contentTypeDescription="Create a new document." ma:contentTypeScope="" ma:versionID="c32302c77d4085ecf495bdddb7f5e889">
   <xsd:schema xmlns:xsd="http://www.w3.org/2001/XMLSchema" xmlns:xs="http://www.w3.org/2001/XMLSchema" xmlns:p="http://schemas.microsoft.com/office/2006/metadata/properties" xmlns:ns2="a4f35948-e619-41b3-aa29-22878b09cfd2" xmlns:ns3="40262f94-9f35-4ac3-9a90-690165a166b7" targetNamespace="http://schemas.microsoft.com/office/2006/metadata/properties" ma:root="true" ma:fieldsID="4ab5ae46be95f9d0be6107e8200be7a2" ns2:_="" ns3:_="">
     <xsd:import namespace="a4f35948-e619-41b3-aa29-22878b09cfd2"/>
@@ -7879,27 +7927,32 @@
 </ct:contentTypeSchema>
 </file>
 
-<file path=customXml/item2.xml><?xml version="1.0" encoding="utf-8"?>
-<?mso-contentType ?>
-<FormTemplates xmlns="http://schemas.microsoft.com/sharepoint/v3/contenttype/forms">
-  <Display>DocumentLibraryForm</Display>
-  <Edit>DocumentLibraryForm</Edit>
-  <New>DocumentLibraryForm</New>
-</FormTemplates>
+<file path=customXml/itemProps1.xml><?xml version="1.0" encoding="utf-8"?>
+<ds:datastoreItem xmlns:ds="http://schemas.openxmlformats.org/officeDocument/2006/customXml" ds:itemID="{91DDEFBA-1D7E-4587-9763-EBF5A6740E9A}">
+  <ds:schemaRefs>
+    <ds:schemaRef ds:uri="http://purl.org/dc/elements/1.1/"/>
+    <ds:schemaRef ds:uri="http://schemas.microsoft.com/office/2006/metadata/properties"/>
+    <ds:schemaRef ds:uri="http://schemas.microsoft.com/office/2006/documentManagement/types"/>
+    <ds:schemaRef ds:uri="http://purl.org/dc/terms/"/>
+    <ds:schemaRef ds:uri="http://schemas.openxmlformats.org/package/2006/metadata/core-properties"/>
+    <ds:schemaRef ds:uri="http://purl.org/dc/dcmitype/"/>
+    <ds:schemaRef ds:uri="http://schemas.microsoft.com/office/infopath/2007/PartnerControls"/>
+    <ds:schemaRef ds:uri="40262f94-9f35-4ac3-9a90-690165a166b7"/>
+    <ds:schemaRef ds:uri="a4f35948-e619-41b3-aa29-22878b09cfd2"/>
+    <ds:schemaRef ds:uri="http://www.w3.org/XML/1998/namespace"/>
+  </ds:schemaRefs>
+</ds:datastoreItem>
 </file>
 
-<file path=customXml/item3.xml><?xml version="1.0" encoding="utf-8"?>
-<p:properties xmlns:p="http://schemas.microsoft.com/office/2006/metadata/properties" xmlns:xsi="http://www.w3.org/2001/XMLSchema-instance" xmlns:pc="http://schemas.microsoft.com/office/infopath/2007/PartnerControls">
-  <documentManagement>
-    <VSO_x0020_item_x0020_id xmlns="40262f94-9f35-4ac3-9a90-690165a166b7" xsi:nil="true"/>
-    <Assetid_x0020_ xmlns="40262f94-9f35-4ac3-9a90-690165a166b7" xsi:nil="true"/>
-    <Item_x0020_Details xmlns="40262f94-9f35-4ac3-9a90-690165a166b7" xsi:nil="true"/>
-    <Template_x0020_details xmlns="40262f94-9f35-4ac3-9a90-690165a166b7" xsi:nil="true"/>
-  </documentManagement>
-</p:properties>
+<file path=customXml/itemProps2.xml><?xml version="1.0" encoding="utf-8"?>
+<ds:datastoreItem xmlns:ds="http://schemas.openxmlformats.org/officeDocument/2006/customXml" ds:itemID="{48E42578-9CD4-4AFF-AA5E-F33052F6B6A6}">
+  <ds:schemaRefs>
+    <ds:schemaRef ds:uri="http://schemas.microsoft.com/sharepoint/v3/contenttype/forms"/>
+  </ds:schemaRefs>
+</ds:datastoreItem>
 </file>
 
-<file path=customXml/itemProps1.xml><?xml version="1.0" encoding="utf-8"?>
+<file path=customXml/itemProps3.xml><?xml version="1.0" encoding="utf-8"?>
 <ds:datastoreItem xmlns:ds="http://schemas.openxmlformats.org/officeDocument/2006/customXml" ds:itemID="{5D30E8E9-C5F6-40D8-943C-DA5B4196A643}">
   <ds:schemaRefs>
     <ds:schemaRef ds:uri="http://schemas.microsoft.com/office/2006/metadata/contentType"/>
@@ -7916,29 +7969,4 @@
     <ds:schemaRef ds:uri="http://schemas.microsoft.com/internal/obd"/>
   </ds:schemaRefs>
 </ds:datastoreItem>
-</file>
-
-<file path=customXml/itemProps2.xml><?xml version="1.0" encoding="utf-8"?>
-<ds:datastoreItem xmlns:ds="http://schemas.openxmlformats.org/officeDocument/2006/customXml" ds:itemID="{48E42578-9CD4-4AFF-AA5E-F33052F6B6A6}">
-  <ds:schemaRefs>
-    <ds:schemaRef ds:uri="http://schemas.microsoft.com/sharepoint/v3/contenttype/forms"/>
-  </ds:schemaRefs>
-</ds:datastoreItem>
-</file>
-
-<file path=customXml/itemProps3.xml><?xml version="1.0" encoding="utf-8"?>
-<ds:datastoreItem xmlns:ds="http://schemas.openxmlformats.org/officeDocument/2006/customXml" ds:itemID="{91DDEFBA-1D7E-4587-9763-EBF5A6740E9A}">
-  <ds:schemaRefs>
-    <ds:schemaRef ds:uri="http://purl.org/dc/elements/1.1/"/>
-    <ds:schemaRef ds:uri="http://schemas.microsoft.com/office/2006/metadata/properties"/>
-    <ds:schemaRef ds:uri="http://schemas.microsoft.com/office/2006/documentManagement/types"/>
-    <ds:schemaRef ds:uri="http://purl.org/dc/terms/"/>
-    <ds:schemaRef ds:uri="http://schemas.openxmlformats.org/package/2006/metadata/core-properties"/>
-    <ds:schemaRef ds:uri="http://purl.org/dc/dcmitype/"/>
-    <ds:schemaRef ds:uri="http://schemas.microsoft.com/office/infopath/2007/PartnerControls"/>
-    <ds:schemaRef ds:uri="40262f94-9f35-4ac3-9a90-690165a166b7"/>
-    <ds:schemaRef ds:uri="a4f35948-e619-41b3-aa29-22878b09cfd2"/>
-    <ds:schemaRef ds:uri="http://www.w3.org/XML/1998/namespace"/>
-  </ds:schemaRefs>
-</ds:datastoreItem>
 </file>
</xml_diff>